<commit_message>
added tour, and application.js
</commit_message>
<xml_diff>
--- a/docs/images/src/dependencies.pptx
+++ b/docs/images/src/dependencies.pptx
@@ -6,6 +6,13 @@
   </p:sldMasterIdLst>
   <p:sldIdLst>
     <p:sldId id="256" r:id="rId2"/>
+    <p:sldId id="257" r:id="rId3"/>
+    <p:sldId id="258" r:id="rId4"/>
+    <p:sldId id="259" r:id="rId5"/>
+    <p:sldId id="260" r:id="rId6"/>
+    <p:sldId id="261" r:id="rId7"/>
+    <p:sldId id="262" r:id="rId8"/>
+    <p:sldId id="263" r:id="rId9"/>
   </p:sldIdLst>
   <p:sldSz cx="9144000" cy="6858000" type="screen4x3"/>
   <p:notesSz cx="6858000" cy="9144000"/>
@@ -288,7 +295,8 @@
           <a:p>
             <a:fld id="{975771E7-F475-4E02-B70C-EB5FFA3E7042}" type="datetimeFigureOut">
               <a:rPr lang="en-US" smtClean="0"/>
-              <a:t>12/16/2007</a:t>
+              <a:pPr/>
+              <a:t>1/26/2008</a:t>
             </a:fld>
             <a:endParaRPr lang="en-US"/>
           </a:p>
@@ -330,6 +338,7 @@
           <a:p>
             <a:fld id="{FBCB980A-DAF7-4C00-B224-671445BF75E0}" type="slidenum">
               <a:rPr lang="en-US" smtClean="0"/>
+              <a:pPr/>
               <a:t>‹#›</a:t>
             </a:fld>
             <a:endParaRPr lang="en-US"/>
@@ -453,7 +462,8 @@
           <a:p>
             <a:fld id="{975771E7-F475-4E02-B70C-EB5FFA3E7042}" type="datetimeFigureOut">
               <a:rPr lang="en-US" smtClean="0"/>
-              <a:t>12/16/2007</a:t>
+              <a:pPr/>
+              <a:t>1/26/2008</a:t>
             </a:fld>
             <a:endParaRPr lang="en-US"/>
           </a:p>
@@ -495,6 +505,7 @@
           <a:p>
             <a:fld id="{FBCB980A-DAF7-4C00-B224-671445BF75E0}" type="slidenum">
               <a:rPr lang="en-US" smtClean="0"/>
+              <a:pPr/>
               <a:t>‹#›</a:t>
             </a:fld>
             <a:endParaRPr lang="en-US"/>
@@ -628,7 +639,8 @@
           <a:p>
             <a:fld id="{975771E7-F475-4E02-B70C-EB5FFA3E7042}" type="datetimeFigureOut">
               <a:rPr lang="en-US" smtClean="0"/>
-              <a:t>12/16/2007</a:t>
+              <a:pPr/>
+              <a:t>1/26/2008</a:t>
             </a:fld>
             <a:endParaRPr lang="en-US"/>
           </a:p>
@@ -670,6 +682,7 @@
           <a:p>
             <a:fld id="{FBCB980A-DAF7-4C00-B224-671445BF75E0}" type="slidenum">
               <a:rPr lang="en-US" smtClean="0"/>
+              <a:pPr/>
               <a:t>‹#›</a:t>
             </a:fld>
             <a:endParaRPr lang="en-US"/>
@@ -793,7 +806,8 @@
           <a:p>
             <a:fld id="{975771E7-F475-4E02-B70C-EB5FFA3E7042}" type="datetimeFigureOut">
               <a:rPr lang="en-US" smtClean="0"/>
-              <a:t>12/16/2007</a:t>
+              <a:pPr/>
+              <a:t>1/26/2008</a:t>
             </a:fld>
             <a:endParaRPr lang="en-US"/>
           </a:p>
@@ -835,6 +849,7 @@
           <a:p>
             <a:fld id="{FBCB980A-DAF7-4C00-B224-671445BF75E0}" type="slidenum">
               <a:rPr lang="en-US" smtClean="0"/>
+              <a:pPr/>
               <a:t>‹#›</a:t>
             </a:fld>
             <a:endParaRPr lang="en-US"/>
@@ -1034,7 +1049,8 @@
           <a:p>
             <a:fld id="{975771E7-F475-4E02-B70C-EB5FFA3E7042}" type="datetimeFigureOut">
               <a:rPr lang="en-US" smtClean="0"/>
-              <a:t>12/16/2007</a:t>
+              <a:pPr/>
+              <a:t>1/26/2008</a:t>
             </a:fld>
             <a:endParaRPr lang="en-US"/>
           </a:p>
@@ -1076,6 +1092,7 @@
           <a:p>
             <a:fld id="{FBCB980A-DAF7-4C00-B224-671445BF75E0}" type="slidenum">
               <a:rPr lang="en-US" smtClean="0"/>
+              <a:pPr/>
               <a:t>‹#›</a:t>
             </a:fld>
             <a:endParaRPr lang="en-US"/>
@@ -1317,7 +1334,8 @@
           <a:p>
             <a:fld id="{975771E7-F475-4E02-B70C-EB5FFA3E7042}" type="datetimeFigureOut">
               <a:rPr lang="en-US" smtClean="0"/>
-              <a:t>12/16/2007</a:t>
+              <a:pPr/>
+              <a:t>1/26/2008</a:t>
             </a:fld>
             <a:endParaRPr lang="en-US"/>
           </a:p>
@@ -1359,6 +1377,7 @@
           <a:p>
             <a:fld id="{FBCB980A-DAF7-4C00-B224-671445BF75E0}" type="slidenum">
               <a:rPr lang="en-US" smtClean="0"/>
+              <a:pPr/>
               <a:t>‹#›</a:t>
             </a:fld>
             <a:endParaRPr lang="en-US"/>
@@ -1734,7 +1753,8 @@
           <a:p>
             <a:fld id="{975771E7-F475-4E02-B70C-EB5FFA3E7042}" type="datetimeFigureOut">
               <a:rPr lang="en-US" smtClean="0"/>
-              <a:t>12/16/2007</a:t>
+              <a:pPr/>
+              <a:t>1/26/2008</a:t>
             </a:fld>
             <a:endParaRPr lang="en-US"/>
           </a:p>
@@ -1776,6 +1796,7 @@
           <a:p>
             <a:fld id="{FBCB980A-DAF7-4C00-B224-671445BF75E0}" type="slidenum">
               <a:rPr lang="en-US" smtClean="0"/>
+              <a:pPr/>
               <a:t>‹#›</a:t>
             </a:fld>
             <a:endParaRPr lang="en-US"/>
@@ -1847,7 +1868,8 @@
           <a:p>
             <a:fld id="{975771E7-F475-4E02-B70C-EB5FFA3E7042}" type="datetimeFigureOut">
               <a:rPr lang="en-US" smtClean="0"/>
-              <a:t>12/16/2007</a:t>
+              <a:pPr/>
+              <a:t>1/26/2008</a:t>
             </a:fld>
             <a:endParaRPr lang="en-US"/>
           </a:p>
@@ -1889,6 +1911,7 @@
           <a:p>
             <a:fld id="{FBCB980A-DAF7-4C00-B224-671445BF75E0}" type="slidenum">
               <a:rPr lang="en-US" smtClean="0"/>
+              <a:pPr/>
               <a:t>‹#›</a:t>
             </a:fld>
             <a:endParaRPr lang="en-US"/>
@@ -1937,7 +1960,8 @@
           <a:p>
             <a:fld id="{975771E7-F475-4E02-B70C-EB5FFA3E7042}" type="datetimeFigureOut">
               <a:rPr lang="en-US" smtClean="0"/>
-              <a:t>12/16/2007</a:t>
+              <a:pPr/>
+              <a:t>1/26/2008</a:t>
             </a:fld>
             <a:endParaRPr lang="en-US"/>
           </a:p>
@@ -1979,6 +2003,7 @@
           <a:p>
             <a:fld id="{FBCB980A-DAF7-4C00-B224-671445BF75E0}" type="slidenum">
               <a:rPr lang="en-US" smtClean="0"/>
+              <a:pPr/>
               <a:t>‹#›</a:t>
             </a:fld>
             <a:endParaRPr lang="en-US"/>
@@ -2209,7 +2234,8 @@
           <a:p>
             <a:fld id="{975771E7-F475-4E02-B70C-EB5FFA3E7042}" type="datetimeFigureOut">
               <a:rPr lang="en-US" smtClean="0"/>
-              <a:t>12/16/2007</a:t>
+              <a:pPr/>
+              <a:t>1/26/2008</a:t>
             </a:fld>
             <a:endParaRPr lang="en-US"/>
           </a:p>
@@ -2251,6 +2277,7 @@
           <a:p>
             <a:fld id="{FBCB980A-DAF7-4C00-B224-671445BF75E0}" type="slidenum">
               <a:rPr lang="en-US" smtClean="0"/>
+              <a:pPr/>
               <a:t>‹#›</a:t>
             </a:fld>
             <a:endParaRPr lang="en-US"/>
@@ -2457,7 +2484,8 @@
           <a:p>
             <a:fld id="{975771E7-F475-4E02-B70C-EB5FFA3E7042}" type="datetimeFigureOut">
               <a:rPr lang="en-US" smtClean="0"/>
-              <a:t>12/16/2007</a:t>
+              <a:pPr/>
+              <a:t>1/26/2008</a:t>
             </a:fld>
             <a:endParaRPr lang="en-US"/>
           </a:p>
@@ -2499,6 +2527,7 @@
           <a:p>
             <a:fld id="{FBCB980A-DAF7-4C00-B224-671445BF75E0}" type="slidenum">
               <a:rPr lang="en-US" smtClean="0"/>
+              <a:pPr/>
               <a:t>‹#›</a:t>
             </a:fld>
             <a:endParaRPr lang="en-US"/>
@@ -2665,7 +2694,8 @@
           <a:p>
             <a:fld id="{975771E7-F475-4E02-B70C-EB5FFA3E7042}" type="datetimeFigureOut">
               <a:rPr lang="en-US" smtClean="0"/>
-              <a:t>12/16/2007</a:t>
+              <a:pPr/>
+              <a:t>1/26/2008</a:t>
             </a:fld>
             <a:endParaRPr lang="en-US"/>
           </a:p>
@@ -2743,6 +2773,7 @@
           <a:p>
             <a:fld id="{FBCB980A-DAF7-4C00-B224-671445BF75E0}" type="slidenum">
               <a:rPr lang="en-US" smtClean="0"/>
+              <a:pPr/>
               <a:t>‹#›</a:t>
             </a:fld>
             <a:endParaRPr lang="en-US"/>
@@ -3709,6 +3740,1907 @@
           </a:fontRef>
         </p:style>
       </p:cxnSp>
+    </p:spTree>
+  </p:cSld>
+  <p:clrMapOvr>
+    <a:masterClrMapping/>
+  </p:clrMapOvr>
+</p:sld>
+</file>
+
+<file path=ppt/slides/slide2.xml><?xml version="1.0" encoding="utf-8"?>
+<p:sld xmlns:a="http://schemas.openxmlformats.org/drawingml/2006/main" xmlns:r="http://schemas.openxmlformats.org/officeDocument/2006/relationships" xmlns:p="http://schemas.openxmlformats.org/presentationml/2006/main">
+  <p:cSld>
+    <p:spTree>
+      <p:nvGrpSpPr>
+        <p:cNvPr id="1" name=""/>
+        <p:cNvGrpSpPr/>
+        <p:nvPr/>
+      </p:nvGrpSpPr>
+      <p:grpSpPr>
+        <a:xfrm>
+          <a:off x="0" y="0"/>
+          <a:ext cx="0" cy="0"/>
+          <a:chOff x="0" y="0"/>
+          <a:chExt cx="0" cy="0"/>
+        </a:xfrm>
+      </p:grpSpPr>
+      <p:sp>
+        <p:nvSpPr>
+          <p:cNvPr id="7" name="Rectangle 6"/>
+          <p:cNvSpPr/>
+          <p:nvPr/>
+        </p:nvSpPr>
+        <p:spPr>
+          <a:xfrm>
+            <a:off x="2133600" y="1066800"/>
+            <a:ext cx="2362200" cy="533400"/>
+          </a:xfrm>
+          <a:prstGeom prst="rect">
+            <a:avLst/>
+          </a:prstGeom>
+          <a:effectLst>
+            <a:outerShdw blurRad="50800" dist="25000" dir="5400000" rotWithShape="0">
+              <a:schemeClr val="accent2">
+                <a:shade val="30000"/>
+                <a:satMod val="150000"/>
+                <a:alpha val="38000"/>
+              </a:schemeClr>
+            </a:outerShdw>
+            <a:reflection blurRad="6350" stA="50000" endA="300" endPos="38500" dist="50800" dir="5400000" sy="-100000" algn="bl" rotWithShape="0"/>
+          </a:effectLst>
+        </p:spPr>
+        <p:style>
+          <a:lnRef idx="1">
+            <a:schemeClr val="accent2"/>
+          </a:lnRef>
+          <a:fillRef idx="2">
+            <a:schemeClr val="accent2"/>
+          </a:fillRef>
+          <a:effectRef idx="1">
+            <a:schemeClr val="accent2"/>
+          </a:effectRef>
+          <a:fontRef idx="minor">
+            <a:schemeClr val="dk1"/>
+          </a:fontRef>
+        </p:style>
+        <p:txBody>
+          <a:bodyPr rtlCol="0" anchor="ctr"/>
+          <a:lstStyle/>
+          <a:p>
+            <a:pPr algn="ctr"/>
+            <a:r>
+              <a:rPr lang="en-US" smtClean="0">
+                <a:solidFill>
+                  <a:schemeClr val="dk1"/>
+                </a:solidFill>
+              </a:rPr>
+              <a:t>Presentation Layer</a:t>
+            </a:r>
+          </a:p>
+          <a:p>
+            <a:pPr algn="ctr"/>
+            <a:r>
+              <a:rPr lang="en-US" sz="1050" smtClean="0"/>
+              <a:t>controllers</a:t>
+            </a:r>
+            <a:endParaRPr lang="en-US">
+              <a:solidFill>
+                <a:schemeClr val="dk1"/>
+              </a:solidFill>
+            </a:endParaRPr>
+          </a:p>
+        </p:txBody>
+      </p:sp>
+      <p:sp>
+        <p:nvSpPr>
+          <p:cNvPr id="8" name="Rectangle 7"/>
+          <p:cNvSpPr/>
+          <p:nvPr/>
+        </p:nvSpPr>
+        <p:spPr>
+          <a:xfrm>
+            <a:off x="2133600" y="1676400"/>
+            <a:ext cx="2362200" cy="533400"/>
+          </a:xfrm>
+          <a:prstGeom prst="rect">
+            <a:avLst/>
+          </a:prstGeom>
+          <a:effectLst>
+            <a:outerShdw blurRad="50800" dist="25000" dir="5400000" rotWithShape="0">
+              <a:schemeClr val="accent2">
+                <a:shade val="30000"/>
+                <a:satMod val="150000"/>
+                <a:alpha val="38000"/>
+              </a:schemeClr>
+            </a:outerShdw>
+            <a:reflection blurRad="6350" stA="50000" endA="300" endPos="38500" dist="50800" dir="5400000" sy="-100000" algn="bl" rotWithShape="0"/>
+          </a:effectLst>
+        </p:spPr>
+        <p:style>
+          <a:lnRef idx="1">
+            <a:schemeClr val="accent2"/>
+          </a:lnRef>
+          <a:fillRef idx="2">
+            <a:schemeClr val="accent2"/>
+          </a:fillRef>
+          <a:effectRef idx="1">
+            <a:schemeClr val="accent2"/>
+          </a:effectRef>
+          <a:fontRef idx="minor">
+            <a:schemeClr val="dk1"/>
+          </a:fontRef>
+        </p:style>
+        <p:txBody>
+          <a:bodyPr rtlCol="0" anchor="ctr"/>
+          <a:lstStyle/>
+          <a:p>
+            <a:pPr algn="ctr"/>
+            <a:r>
+              <a:rPr lang="en-US" smtClean="0">
+                <a:solidFill>
+                  <a:schemeClr val="dk1"/>
+                </a:solidFill>
+              </a:rPr>
+              <a:t>Business Layer</a:t>
+            </a:r>
+          </a:p>
+          <a:p>
+            <a:pPr algn="ctr"/>
+            <a:r>
+              <a:rPr lang="en-US" sz="1050" smtClean="0">
+                <a:solidFill>
+                  <a:schemeClr val="bg1"/>
+                </a:solidFill>
+              </a:rPr>
+              <a:t>services</a:t>
+            </a:r>
+          </a:p>
+        </p:txBody>
+      </p:sp>
+      <p:sp>
+        <p:nvSpPr>
+          <p:cNvPr id="9" name="Rectangle 8"/>
+          <p:cNvSpPr/>
+          <p:nvPr/>
+        </p:nvSpPr>
+        <p:spPr>
+          <a:xfrm>
+            <a:off x="2133600" y="2286000"/>
+            <a:ext cx="2362200" cy="533400"/>
+          </a:xfrm>
+          <a:prstGeom prst="rect">
+            <a:avLst/>
+          </a:prstGeom>
+          <a:effectLst>
+            <a:outerShdw blurRad="50800" dist="25000" dir="5400000" rotWithShape="0">
+              <a:schemeClr val="accent2">
+                <a:shade val="30000"/>
+                <a:satMod val="150000"/>
+                <a:alpha val="38000"/>
+              </a:schemeClr>
+            </a:outerShdw>
+            <a:reflection blurRad="6350" stA="50000" endA="300" endPos="38500" dist="50800" dir="5400000" sy="-100000" algn="bl" rotWithShape="0"/>
+          </a:effectLst>
+        </p:spPr>
+        <p:style>
+          <a:lnRef idx="1">
+            <a:schemeClr val="accent2"/>
+          </a:lnRef>
+          <a:fillRef idx="2">
+            <a:schemeClr val="accent2"/>
+          </a:fillRef>
+          <a:effectRef idx="1">
+            <a:schemeClr val="accent2"/>
+          </a:effectRef>
+          <a:fontRef idx="minor">
+            <a:schemeClr val="dk1"/>
+          </a:fontRef>
+        </p:style>
+        <p:txBody>
+          <a:bodyPr rtlCol="0" anchor="ctr"/>
+          <a:lstStyle/>
+          <a:p>
+            <a:pPr algn="ctr"/>
+            <a:r>
+              <a:rPr lang="en-US" smtClean="0">
+                <a:solidFill>
+                  <a:schemeClr val="dk1"/>
+                </a:solidFill>
+              </a:rPr>
+              <a:t>Integration Layer</a:t>
+            </a:r>
+          </a:p>
+          <a:p>
+            <a:pPr algn="ctr"/>
+            <a:r>
+              <a:rPr lang="en-US" sz="1050" smtClean="0">
+                <a:solidFill>
+                  <a:schemeClr val="bg1"/>
+                </a:solidFill>
+              </a:rPr>
+              <a:t>daos</a:t>
+            </a:r>
+          </a:p>
+        </p:txBody>
+      </p:sp>
+      <p:sp>
+        <p:nvSpPr>
+          <p:cNvPr id="12" name="Curved Right Arrow 11"/>
+          <p:cNvSpPr/>
+          <p:nvPr/>
+        </p:nvSpPr>
+        <p:spPr>
+          <a:xfrm>
+            <a:off x="1447800" y="1295400"/>
+            <a:ext cx="609600" cy="1447800"/>
+          </a:xfrm>
+          <a:prstGeom prst="curvedRightArrow">
+            <a:avLst>
+              <a:gd name="adj1" fmla="val 21062"/>
+              <a:gd name="adj2" fmla="val 56524"/>
+              <a:gd name="adj3" fmla="val 34062"/>
+            </a:avLst>
+          </a:prstGeom>
+        </p:spPr>
+        <p:style>
+          <a:lnRef idx="1">
+            <a:schemeClr val="accent2"/>
+          </a:lnRef>
+          <a:fillRef idx="2">
+            <a:schemeClr val="accent2"/>
+          </a:fillRef>
+          <a:effectRef idx="1">
+            <a:schemeClr val="accent2"/>
+          </a:effectRef>
+          <a:fontRef idx="minor">
+            <a:schemeClr val="dk1"/>
+          </a:fontRef>
+        </p:style>
+        <p:txBody>
+          <a:bodyPr rtlCol="0" anchor="ctr"/>
+          <a:lstStyle/>
+          <a:p>
+            <a:pPr algn="ctr"/>
+            <a:endParaRPr lang="en-US" smtClean="0">
+              <a:solidFill>
+                <a:schemeClr val="dk1"/>
+              </a:solidFill>
+            </a:endParaRPr>
+          </a:p>
+        </p:txBody>
+      </p:sp>
+      <p:sp>
+        <p:nvSpPr>
+          <p:cNvPr id="10" name="&quot;No&quot; Symbol 9"/>
+          <p:cNvSpPr/>
+          <p:nvPr/>
+        </p:nvSpPr>
+        <p:spPr>
+          <a:xfrm>
+            <a:off x="1219200" y="1676400"/>
+            <a:ext cx="533400" cy="533400"/>
+          </a:xfrm>
+          <a:prstGeom prst="noSmoking">
+            <a:avLst/>
+          </a:prstGeom>
+        </p:spPr>
+        <p:style>
+          <a:lnRef idx="1">
+            <a:schemeClr val="accent5"/>
+          </a:lnRef>
+          <a:fillRef idx="2">
+            <a:schemeClr val="accent5"/>
+          </a:fillRef>
+          <a:effectRef idx="1">
+            <a:schemeClr val="accent5"/>
+          </a:effectRef>
+          <a:fontRef idx="minor">
+            <a:schemeClr val="dk1"/>
+          </a:fontRef>
+        </p:style>
+        <p:txBody>
+          <a:bodyPr rtlCol="0" anchor="ctr"/>
+          <a:lstStyle/>
+          <a:p>
+            <a:pPr algn="ctr"/>
+            <a:endParaRPr lang="en-US" smtClean="0">
+              <a:solidFill>
+                <a:schemeClr val="dk1"/>
+              </a:solidFill>
+            </a:endParaRPr>
+          </a:p>
+        </p:txBody>
+      </p:sp>
+      <p:grpSp>
+        <p:nvGrpSpPr>
+          <p:cNvPr id="13" name="Group 12"/>
+          <p:cNvGrpSpPr/>
+          <p:nvPr/>
+        </p:nvGrpSpPr>
+        <p:grpSpPr>
+          <a:xfrm>
+            <a:off x="6163322" y="1927932"/>
+            <a:ext cx="1600200" cy="436415"/>
+            <a:chOff x="1981200" y="2971800"/>
+            <a:chExt cx="1600200" cy="1066800"/>
+          </a:xfrm>
+        </p:grpSpPr>
+        <p:sp>
+          <p:nvSpPr>
+            <p:cNvPr id="14" name="Rectangle 13"/>
+            <p:cNvSpPr/>
+            <p:nvPr/>
+          </p:nvSpPr>
+          <p:spPr>
+            <a:xfrm>
+              <a:off x="1981200" y="2971800"/>
+              <a:ext cx="609600" cy="152400"/>
+            </a:xfrm>
+            <a:prstGeom prst="rect">
+              <a:avLst/>
+            </a:prstGeom>
+          </p:spPr>
+          <p:style>
+            <a:lnRef idx="1">
+              <a:schemeClr val="accent2"/>
+            </a:lnRef>
+            <a:fillRef idx="2">
+              <a:schemeClr val="accent2"/>
+            </a:fillRef>
+            <a:effectRef idx="1">
+              <a:schemeClr val="accent2"/>
+            </a:effectRef>
+            <a:fontRef idx="minor">
+              <a:schemeClr val="dk1"/>
+            </a:fontRef>
+          </p:style>
+          <p:txBody>
+            <a:bodyPr rtlCol="0" anchor="ctr"/>
+            <a:lstStyle/>
+            <a:p>
+              <a:pPr algn="ctr"/>
+              <a:endParaRPr lang="en-US"/>
+            </a:p>
+          </p:txBody>
+        </p:sp>
+        <p:sp>
+          <p:nvSpPr>
+            <p:cNvPr id="15" name="Rectangle 14"/>
+            <p:cNvSpPr/>
+            <p:nvPr/>
+          </p:nvSpPr>
+          <p:spPr>
+            <a:xfrm>
+              <a:off x="1981200" y="3124200"/>
+              <a:ext cx="1600200" cy="914400"/>
+            </a:xfrm>
+            <a:prstGeom prst="rect">
+              <a:avLst/>
+            </a:prstGeom>
+          </p:spPr>
+          <p:style>
+            <a:lnRef idx="1">
+              <a:schemeClr val="accent2"/>
+            </a:lnRef>
+            <a:fillRef idx="2">
+              <a:schemeClr val="accent2"/>
+            </a:fillRef>
+            <a:effectRef idx="1">
+              <a:schemeClr val="accent2"/>
+            </a:effectRef>
+            <a:fontRef idx="minor">
+              <a:schemeClr val="dk1"/>
+            </a:fontRef>
+          </p:style>
+          <p:txBody>
+            <a:bodyPr rtlCol="0" anchor="ctr"/>
+            <a:lstStyle/>
+            <a:p>
+              <a:pPr algn="ctr"/>
+              <a:r>
+                <a:rPr lang="en-US" smtClean="0"/>
+                <a:t>package b</a:t>
+              </a:r>
+              <a:endParaRPr lang="en-US"/>
+            </a:p>
+          </p:txBody>
+        </p:sp>
+      </p:grpSp>
+      <p:cxnSp>
+        <p:nvCxnSpPr>
+          <p:cNvPr id="16" name="Elbow Connector 6"/>
+          <p:cNvCxnSpPr>
+            <a:stCxn id="23" idx="2"/>
+            <a:endCxn id="20" idx="1"/>
+          </p:cNvCxnSpPr>
+          <p:nvPr/>
+        </p:nvCxnSpPr>
+        <p:spPr>
+          <a:xfrm rot="5400000" flipH="1">
+            <a:off x="5692061" y="1858689"/>
+            <a:ext cx="1751499" cy="791222"/>
+          </a:xfrm>
+          <a:prstGeom prst="bentConnector4">
+            <a:avLst>
+              <a:gd name="adj1" fmla="val -7883"/>
+              <a:gd name="adj2" fmla="val 140111"/>
+            </a:avLst>
+          </a:prstGeom>
+          <a:ln>
+            <a:prstDash val="dash"/>
+            <a:tailEnd type="triangle" w="lg" len="lg"/>
+          </a:ln>
+        </p:spPr>
+        <p:style>
+          <a:lnRef idx="1">
+            <a:schemeClr val="accent2"/>
+          </a:lnRef>
+          <a:fillRef idx="2">
+            <a:schemeClr val="accent2"/>
+          </a:fillRef>
+          <a:effectRef idx="1">
+            <a:schemeClr val="accent2"/>
+          </a:effectRef>
+          <a:fontRef idx="minor">
+            <a:schemeClr val="dk1"/>
+          </a:fontRef>
+        </p:style>
+      </p:cxnSp>
+      <p:cxnSp>
+        <p:nvCxnSpPr>
+          <p:cNvPr id="17" name="Straight Arrow Connector 16"/>
+          <p:cNvCxnSpPr/>
+          <p:nvPr/>
+        </p:nvCxnSpPr>
+        <p:spPr>
+          <a:xfrm rot="5400000">
+            <a:off x="6762249" y="1789907"/>
+            <a:ext cx="381002" cy="1588"/>
+          </a:xfrm>
+          <a:prstGeom prst="straightConnector1">
+            <a:avLst/>
+          </a:prstGeom>
+          <a:ln>
+            <a:prstDash val="dash"/>
+            <a:tailEnd type="triangle" w="lg" len="lg"/>
+          </a:ln>
+        </p:spPr>
+        <p:style>
+          <a:lnRef idx="1">
+            <a:schemeClr val="accent2"/>
+          </a:lnRef>
+          <a:fillRef idx="2">
+            <a:schemeClr val="accent2"/>
+          </a:fillRef>
+          <a:effectRef idx="1">
+            <a:schemeClr val="accent2"/>
+          </a:effectRef>
+          <a:fontRef idx="minor">
+            <a:schemeClr val="dk1"/>
+          </a:fontRef>
+        </p:style>
+      </p:cxnSp>
+      <p:grpSp>
+        <p:nvGrpSpPr>
+          <p:cNvPr id="18" name="Group 17"/>
+          <p:cNvGrpSpPr/>
+          <p:nvPr/>
+        </p:nvGrpSpPr>
+        <p:grpSpPr>
+          <a:xfrm>
+            <a:off x="6172200" y="1129170"/>
+            <a:ext cx="1600200" cy="436415"/>
+            <a:chOff x="1988130" y="685800"/>
+            <a:chExt cx="1600200" cy="1066800"/>
+          </a:xfrm>
+        </p:grpSpPr>
+        <p:sp>
+          <p:nvSpPr>
+            <p:cNvPr id="19" name="Rectangle 18"/>
+            <p:cNvSpPr/>
+            <p:nvPr/>
+          </p:nvSpPr>
+          <p:spPr>
+            <a:xfrm>
+              <a:off x="1995055" y="685800"/>
+              <a:ext cx="609600" cy="152400"/>
+            </a:xfrm>
+            <a:prstGeom prst="rect">
+              <a:avLst/>
+            </a:prstGeom>
+          </p:spPr>
+          <p:style>
+            <a:lnRef idx="1">
+              <a:schemeClr val="accent2"/>
+            </a:lnRef>
+            <a:fillRef idx="2">
+              <a:schemeClr val="accent2"/>
+            </a:fillRef>
+            <a:effectRef idx="1">
+              <a:schemeClr val="accent2"/>
+            </a:effectRef>
+            <a:fontRef idx="minor">
+              <a:schemeClr val="dk1"/>
+            </a:fontRef>
+          </p:style>
+          <p:txBody>
+            <a:bodyPr rtlCol="0" anchor="ctr"/>
+            <a:lstStyle/>
+            <a:p>
+              <a:pPr algn="ctr"/>
+              <a:endParaRPr lang="en-US"/>
+            </a:p>
+          </p:txBody>
+        </p:sp>
+        <p:sp>
+          <p:nvSpPr>
+            <p:cNvPr id="20" name="Rectangle 19"/>
+            <p:cNvSpPr/>
+            <p:nvPr/>
+          </p:nvSpPr>
+          <p:spPr>
+            <a:xfrm>
+              <a:off x="1988130" y="838200"/>
+              <a:ext cx="1600200" cy="914400"/>
+            </a:xfrm>
+            <a:prstGeom prst="rect">
+              <a:avLst/>
+            </a:prstGeom>
+          </p:spPr>
+          <p:style>
+            <a:lnRef idx="1">
+              <a:schemeClr val="accent2"/>
+            </a:lnRef>
+            <a:fillRef idx="2">
+              <a:schemeClr val="accent2"/>
+            </a:fillRef>
+            <a:effectRef idx="1">
+              <a:schemeClr val="accent2"/>
+            </a:effectRef>
+            <a:fontRef idx="minor">
+              <a:schemeClr val="dk1"/>
+            </a:fontRef>
+          </p:style>
+          <p:txBody>
+            <a:bodyPr rtlCol="0" anchor="ctr"/>
+            <a:lstStyle/>
+            <a:p>
+              <a:pPr algn="ctr"/>
+              <a:r>
+                <a:rPr lang="en-US"/>
+                <a:t>p</a:t>
+              </a:r>
+              <a:r>
+                <a:rPr lang="en-US" smtClean="0"/>
+                <a:t>ackage a</a:t>
+              </a:r>
+              <a:endParaRPr lang="en-US"/>
+            </a:p>
+          </p:txBody>
+        </p:sp>
+      </p:grpSp>
+      <p:grpSp>
+        <p:nvGrpSpPr>
+          <p:cNvPr id="21" name="Group 20"/>
+          <p:cNvGrpSpPr/>
+          <p:nvPr/>
+        </p:nvGrpSpPr>
+        <p:grpSpPr>
+          <a:xfrm>
+            <a:off x="6163322" y="2693634"/>
+            <a:ext cx="1600200" cy="436415"/>
+            <a:chOff x="1981200" y="2971800"/>
+            <a:chExt cx="1600200" cy="1066800"/>
+          </a:xfrm>
+        </p:grpSpPr>
+        <p:sp>
+          <p:nvSpPr>
+            <p:cNvPr id="22" name="Rectangle 21"/>
+            <p:cNvSpPr/>
+            <p:nvPr/>
+          </p:nvSpPr>
+          <p:spPr>
+            <a:xfrm>
+              <a:off x="1981200" y="2971800"/>
+              <a:ext cx="609600" cy="152400"/>
+            </a:xfrm>
+            <a:prstGeom prst="rect">
+              <a:avLst/>
+            </a:prstGeom>
+          </p:spPr>
+          <p:style>
+            <a:lnRef idx="1">
+              <a:schemeClr val="accent2"/>
+            </a:lnRef>
+            <a:fillRef idx="2">
+              <a:schemeClr val="accent2"/>
+            </a:fillRef>
+            <a:effectRef idx="1">
+              <a:schemeClr val="accent2"/>
+            </a:effectRef>
+            <a:fontRef idx="minor">
+              <a:schemeClr val="dk1"/>
+            </a:fontRef>
+          </p:style>
+          <p:txBody>
+            <a:bodyPr rtlCol="0" anchor="ctr"/>
+            <a:lstStyle/>
+            <a:p>
+              <a:pPr algn="ctr"/>
+              <a:endParaRPr lang="en-US"/>
+            </a:p>
+          </p:txBody>
+        </p:sp>
+        <p:sp>
+          <p:nvSpPr>
+            <p:cNvPr id="23" name="Rectangle 22"/>
+            <p:cNvSpPr/>
+            <p:nvPr/>
+          </p:nvSpPr>
+          <p:spPr>
+            <a:xfrm>
+              <a:off x="1981200" y="3124200"/>
+              <a:ext cx="1600200" cy="914400"/>
+            </a:xfrm>
+            <a:prstGeom prst="rect">
+              <a:avLst/>
+            </a:prstGeom>
+          </p:spPr>
+          <p:style>
+            <a:lnRef idx="1">
+              <a:schemeClr val="accent2"/>
+            </a:lnRef>
+            <a:fillRef idx="2">
+              <a:schemeClr val="accent2"/>
+            </a:fillRef>
+            <a:effectRef idx="1">
+              <a:schemeClr val="accent2"/>
+            </a:effectRef>
+            <a:fontRef idx="minor">
+              <a:schemeClr val="dk1"/>
+            </a:fontRef>
+          </p:style>
+          <p:txBody>
+            <a:bodyPr rtlCol="0" anchor="ctr"/>
+            <a:lstStyle/>
+            <a:p>
+              <a:pPr algn="ctr"/>
+              <a:r>
+                <a:rPr lang="en-US" smtClean="0"/>
+                <a:t>package c</a:t>
+              </a:r>
+              <a:endParaRPr lang="en-US"/>
+            </a:p>
+          </p:txBody>
+        </p:sp>
+      </p:grpSp>
+      <p:cxnSp>
+        <p:nvCxnSpPr>
+          <p:cNvPr id="26" name="Straight Arrow Connector 25"/>
+          <p:cNvCxnSpPr/>
+          <p:nvPr/>
+        </p:nvCxnSpPr>
+        <p:spPr>
+          <a:xfrm rot="5400000">
+            <a:off x="6762249" y="2551905"/>
+            <a:ext cx="381002" cy="1588"/>
+          </a:xfrm>
+          <a:prstGeom prst="straightConnector1">
+            <a:avLst/>
+          </a:prstGeom>
+          <a:ln>
+            <a:prstDash val="dash"/>
+            <a:tailEnd type="triangle" w="lg" len="lg"/>
+          </a:ln>
+        </p:spPr>
+        <p:style>
+          <a:lnRef idx="1">
+            <a:schemeClr val="accent2"/>
+          </a:lnRef>
+          <a:fillRef idx="2">
+            <a:schemeClr val="accent2"/>
+          </a:fillRef>
+          <a:effectRef idx="1">
+            <a:schemeClr val="accent2"/>
+          </a:effectRef>
+          <a:fontRef idx="minor">
+            <a:schemeClr val="dk1"/>
+          </a:fontRef>
+        </p:style>
+      </p:cxnSp>
+      <p:sp>
+        <p:nvSpPr>
+          <p:cNvPr id="33" name="&quot;No&quot; Symbol 32"/>
+          <p:cNvSpPr/>
+          <p:nvPr/>
+        </p:nvSpPr>
+        <p:spPr>
+          <a:xfrm>
+            <a:off x="5638800" y="2057400"/>
+            <a:ext cx="381000" cy="381000"/>
+          </a:xfrm>
+          <a:prstGeom prst="noSmoking">
+            <a:avLst>
+              <a:gd name="adj" fmla="val 18474"/>
+            </a:avLst>
+          </a:prstGeom>
+        </p:spPr>
+        <p:style>
+          <a:lnRef idx="1">
+            <a:schemeClr val="accent5"/>
+          </a:lnRef>
+          <a:fillRef idx="2">
+            <a:schemeClr val="accent5"/>
+          </a:fillRef>
+          <a:effectRef idx="1">
+            <a:schemeClr val="accent5"/>
+          </a:effectRef>
+          <a:fontRef idx="minor">
+            <a:schemeClr val="dk1"/>
+          </a:fontRef>
+        </p:style>
+        <p:txBody>
+          <a:bodyPr rtlCol="0" anchor="ctr"/>
+          <a:lstStyle/>
+          <a:p>
+            <a:pPr algn="ctr"/>
+            <a:endParaRPr lang="en-US" smtClean="0">
+              <a:solidFill>
+                <a:schemeClr val="dk1"/>
+              </a:solidFill>
+            </a:endParaRPr>
+          </a:p>
+        </p:txBody>
+      </p:sp>
+      <p:pic>
+        <p:nvPicPr>
+          <p:cNvPr id="3074" name="Picture 2"/>
+          <p:cNvPicPr>
+            <a:picLocks noChangeAspect="1" noChangeArrowheads="1"/>
+          </p:cNvPicPr>
+          <p:nvPr/>
+        </p:nvPicPr>
+        <p:blipFill>
+          <a:blip r:embed="rId2"/>
+          <a:srcRect/>
+          <a:stretch>
+            <a:fillRect/>
+          </a:stretch>
+        </p:blipFill>
+        <p:spPr bwMode="auto">
+          <a:xfrm>
+            <a:off x="1295400" y="3352800"/>
+            <a:ext cx="3962400" cy="3260489"/>
+          </a:xfrm>
+          <a:prstGeom prst="rect">
+            <a:avLst/>
+          </a:prstGeom>
+          <a:noFill/>
+          <a:ln w="9525">
+            <a:noFill/>
+            <a:miter lim="800000"/>
+            <a:headEnd/>
+            <a:tailEnd/>
+          </a:ln>
+          <a:effectLst/>
+        </p:spPr>
+      </p:pic>
+    </p:spTree>
+  </p:cSld>
+  <p:clrMapOvr>
+    <a:masterClrMapping/>
+  </p:clrMapOvr>
+</p:sld>
+</file>
+
+<file path=ppt/slides/slide3.xml><?xml version="1.0" encoding="utf-8"?>
+<p:sld xmlns:a="http://schemas.openxmlformats.org/drawingml/2006/main" xmlns:r="http://schemas.openxmlformats.org/officeDocument/2006/relationships" xmlns:p="http://schemas.openxmlformats.org/presentationml/2006/main">
+  <p:cSld>
+    <p:spTree>
+      <p:nvGrpSpPr>
+        <p:cNvPr id="1" name=""/>
+        <p:cNvGrpSpPr/>
+        <p:nvPr/>
+      </p:nvGrpSpPr>
+      <p:grpSpPr>
+        <a:xfrm>
+          <a:off x="0" y="0"/>
+          <a:ext cx="0" cy="0"/>
+          <a:chOff x="0" y="0"/>
+          <a:chExt cx="0" cy="0"/>
+        </a:xfrm>
+      </p:grpSpPr>
+      <p:sp>
+        <p:nvSpPr>
+          <p:cNvPr id="4" name="Rectangle 3"/>
+          <p:cNvSpPr/>
+          <p:nvPr/>
+        </p:nvSpPr>
+        <p:spPr>
+          <a:xfrm>
+            <a:off x="2133600" y="1066800"/>
+            <a:ext cx="2362200" cy="533400"/>
+          </a:xfrm>
+          <a:prstGeom prst="rect">
+            <a:avLst/>
+          </a:prstGeom>
+          <a:effectLst>
+            <a:outerShdw blurRad="50800" dist="25000" dir="5400000" rotWithShape="0">
+              <a:schemeClr val="accent2">
+                <a:shade val="30000"/>
+                <a:satMod val="150000"/>
+                <a:alpha val="38000"/>
+              </a:schemeClr>
+            </a:outerShdw>
+            <a:reflection blurRad="6350" stA="50000" endA="300" endPos="38500" dist="50800" dir="5400000" sy="-100000" algn="bl" rotWithShape="0"/>
+          </a:effectLst>
+        </p:spPr>
+        <p:style>
+          <a:lnRef idx="1">
+            <a:schemeClr val="accent2"/>
+          </a:lnRef>
+          <a:fillRef idx="2">
+            <a:schemeClr val="accent2"/>
+          </a:fillRef>
+          <a:effectRef idx="1">
+            <a:schemeClr val="accent2"/>
+          </a:effectRef>
+          <a:fontRef idx="minor">
+            <a:schemeClr val="dk1"/>
+          </a:fontRef>
+        </p:style>
+        <p:txBody>
+          <a:bodyPr rtlCol="0" anchor="ctr"/>
+          <a:lstStyle/>
+          <a:p>
+            <a:pPr algn="ctr"/>
+            <a:r>
+              <a:rPr lang="en-US" smtClean="0">
+                <a:solidFill>
+                  <a:schemeClr val="dk1"/>
+                </a:solidFill>
+              </a:rPr>
+              <a:t>Presentation Layer</a:t>
+            </a:r>
+          </a:p>
+          <a:p>
+            <a:pPr algn="ctr"/>
+            <a:r>
+              <a:rPr lang="en-US" sz="1050" smtClean="0"/>
+              <a:t>controllers</a:t>
+            </a:r>
+            <a:endParaRPr lang="en-US">
+              <a:solidFill>
+                <a:schemeClr val="dk1"/>
+              </a:solidFill>
+            </a:endParaRPr>
+          </a:p>
+        </p:txBody>
+      </p:sp>
+      <p:sp>
+        <p:nvSpPr>
+          <p:cNvPr id="5" name="Rectangle 4"/>
+          <p:cNvSpPr/>
+          <p:nvPr/>
+        </p:nvSpPr>
+        <p:spPr>
+          <a:xfrm>
+            <a:off x="2133600" y="1676400"/>
+            <a:ext cx="2362200" cy="533400"/>
+          </a:xfrm>
+          <a:prstGeom prst="rect">
+            <a:avLst/>
+          </a:prstGeom>
+          <a:effectLst>
+            <a:outerShdw blurRad="50800" dist="25000" dir="5400000" rotWithShape="0">
+              <a:schemeClr val="accent2">
+                <a:shade val="30000"/>
+                <a:satMod val="150000"/>
+                <a:alpha val="38000"/>
+              </a:schemeClr>
+            </a:outerShdw>
+            <a:reflection blurRad="6350" stA="50000" endA="300" endPos="38500" dist="50800" dir="5400000" sy="-100000" algn="bl" rotWithShape="0"/>
+          </a:effectLst>
+        </p:spPr>
+        <p:style>
+          <a:lnRef idx="1">
+            <a:schemeClr val="accent2"/>
+          </a:lnRef>
+          <a:fillRef idx="2">
+            <a:schemeClr val="accent2"/>
+          </a:fillRef>
+          <a:effectRef idx="1">
+            <a:schemeClr val="accent2"/>
+          </a:effectRef>
+          <a:fontRef idx="minor">
+            <a:schemeClr val="dk1"/>
+          </a:fontRef>
+        </p:style>
+        <p:txBody>
+          <a:bodyPr rtlCol="0" anchor="ctr"/>
+          <a:lstStyle/>
+          <a:p>
+            <a:pPr algn="ctr"/>
+            <a:r>
+              <a:rPr lang="en-US" smtClean="0">
+                <a:solidFill>
+                  <a:schemeClr val="dk1"/>
+                </a:solidFill>
+              </a:rPr>
+              <a:t>Business Layer</a:t>
+            </a:r>
+          </a:p>
+          <a:p>
+            <a:pPr algn="ctr"/>
+            <a:r>
+              <a:rPr lang="en-US" sz="1050" smtClean="0">
+                <a:solidFill>
+                  <a:schemeClr val="bg1"/>
+                </a:solidFill>
+              </a:rPr>
+              <a:t>services</a:t>
+            </a:r>
+          </a:p>
+        </p:txBody>
+      </p:sp>
+      <p:sp>
+        <p:nvSpPr>
+          <p:cNvPr id="6" name="Rectangle 5"/>
+          <p:cNvSpPr/>
+          <p:nvPr/>
+        </p:nvSpPr>
+        <p:spPr>
+          <a:xfrm>
+            <a:off x="2133600" y="2286000"/>
+            <a:ext cx="2362200" cy="533400"/>
+          </a:xfrm>
+          <a:prstGeom prst="rect">
+            <a:avLst/>
+          </a:prstGeom>
+          <a:effectLst>
+            <a:outerShdw blurRad="50800" dist="25000" dir="5400000" rotWithShape="0">
+              <a:schemeClr val="accent2">
+                <a:shade val="30000"/>
+                <a:satMod val="150000"/>
+                <a:alpha val="38000"/>
+              </a:schemeClr>
+            </a:outerShdw>
+            <a:reflection blurRad="6350" stA="50000" endA="300" endPos="38500" dist="50800" dir="5400000" sy="-100000" algn="bl" rotWithShape="0"/>
+          </a:effectLst>
+        </p:spPr>
+        <p:style>
+          <a:lnRef idx="1">
+            <a:schemeClr val="accent2"/>
+          </a:lnRef>
+          <a:fillRef idx="2">
+            <a:schemeClr val="accent2"/>
+          </a:fillRef>
+          <a:effectRef idx="1">
+            <a:schemeClr val="accent2"/>
+          </a:effectRef>
+          <a:fontRef idx="minor">
+            <a:schemeClr val="dk1"/>
+          </a:fontRef>
+        </p:style>
+        <p:txBody>
+          <a:bodyPr rtlCol="0" anchor="ctr"/>
+          <a:lstStyle/>
+          <a:p>
+            <a:pPr algn="ctr"/>
+            <a:r>
+              <a:rPr lang="en-US" smtClean="0">
+                <a:solidFill>
+                  <a:schemeClr val="dk1"/>
+                </a:solidFill>
+              </a:rPr>
+              <a:t>Integration Layer</a:t>
+            </a:r>
+          </a:p>
+          <a:p>
+            <a:pPr algn="ctr"/>
+            <a:r>
+              <a:rPr lang="en-US" sz="1050" smtClean="0">
+                <a:solidFill>
+                  <a:schemeClr val="bg1"/>
+                </a:solidFill>
+              </a:rPr>
+              <a:t>daos</a:t>
+            </a:r>
+          </a:p>
+        </p:txBody>
+      </p:sp>
+      <p:sp>
+        <p:nvSpPr>
+          <p:cNvPr id="7" name="Curved Right Arrow 6"/>
+          <p:cNvSpPr/>
+          <p:nvPr/>
+        </p:nvSpPr>
+        <p:spPr>
+          <a:xfrm>
+            <a:off x="1447800" y="1295400"/>
+            <a:ext cx="609600" cy="1447800"/>
+          </a:xfrm>
+          <a:prstGeom prst="curvedRightArrow">
+            <a:avLst>
+              <a:gd name="adj1" fmla="val 21062"/>
+              <a:gd name="adj2" fmla="val 56524"/>
+              <a:gd name="adj3" fmla="val 34062"/>
+            </a:avLst>
+          </a:prstGeom>
+        </p:spPr>
+        <p:style>
+          <a:lnRef idx="1">
+            <a:schemeClr val="accent2"/>
+          </a:lnRef>
+          <a:fillRef idx="2">
+            <a:schemeClr val="accent2"/>
+          </a:fillRef>
+          <a:effectRef idx="1">
+            <a:schemeClr val="accent2"/>
+          </a:effectRef>
+          <a:fontRef idx="minor">
+            <a:schemeClr val="dk1"/>
+          </a:fontRef>
+        </p:style>
+        <p:txBody>
+          <a:bodyPr rtlCol="0" anchor="ctr"/>
+          <a:lstStyle/>
+          <a:p>
+            <a:pPr algn="ctr"/>
+            <a:endParaRPr lang="en-US" smtClean="0">
+              <a:solidFill>
+                <a:schemeClr val="dk1"/>
+              </a:solidFill>
+            </a:endParaRPr>
+          </a:p>
+        </p:txBody>
+      </p:sp>
+      <p:sp>
+        <p:nvSpPr>
+          <p:cNvPr id="8" name="&quot;No&quot; Symbol 7"/>
+          <p:cNvSpPr/>
+          <p:nvPr/>
+        </p:nvSpPr>
+        <p:spPr>
+          <a:xfrm>
+            <a:off x="1219200" y="1676400"/>
+            <a:ext cx="533400" cy="533400"/>
+          </a:xfrm>
+          <a:prstGeom prst="noSmoking">
+            <a:avLst/>
+          </a:prstGeom>
+        </p:spPr>
+        <p:style>
+          <a:lnRef idx="1">
+            <a:schemeClr val="accent5"/>
+          </a:lnRef>
+          <a:fillRef idx="2">
+            <a:schemeClr val="accent5"/>
+          </a:fillRef>
+          <a:effectRef idx="1">
+            <a:schemeClr val="accent5"/>
+          </a:effectRef>
+          <a:fontRef idx="minor">
+            <a:schemeClr val="dk1"/>
+          </a:fontRef>
+        </p:style>
+        <p:txBody>
+          <a:bodyPr rtlCol="0" anchor="ctr"/>
+          <a:lstStyle/>
+          <a:p>
+            <a:pPr algn="ctr"/>
+            <a:endParaRPr lang="en-US" smtClean="0">
+              <a:solidFill>
+                <a:schemeClr val="dk1"/>
+              </a:solidFill>
+            </a:endParaRPr>
+          </a:p>
+        </p:txBody>
+      </p:sp>
+      <p:pic>
+        <p:nvPicPr>
+          <p:cNvPr id="1027" name="Picture 3"/>
+          <p:cNvPicPr>
+            <a:picLocks noChangeAspect="1" noChangeArrowheads="1"/>
+          </p:cNvPicPr>
+          <p:nvPr/>
+        </p:nvPicPr>
+        <p:blipFill>
+          <a:blip r:embed="rId2"/>
+          <a:srcRect/>
+          <a:stretch>
+            <a:fillRect/>
+          </a:stretch>
+        </p:blipFill>
+        <p:spPr bwMode="auto">
+          <a:xfrm>
+            <a:off x="3810000" y="3505200"/>
+            <a:ext cx="4238625" cy="2476500"/>
+          </a:xfrm>
+          <a:prstGeom prst="roundRect">
+            <a:avLst>
+              <a:gd name="adj" fmla="val 16667"/>
+            </a:avLst>
+          </a:prstGeom>
+          <a:ln>
+            <a:noFill/>
+          </a:ln>
+          <a:effectLst>
+            <a:outerShdw blurRad="152400" dist="12000" dir="900000" sy="98000" kx="110000" ky="200000" algn="tl" rotWithShape="0">
+              <a:srgbClr val="000000">
+                <a:alpha val="30000"/>
+              </a:srgbClr>
+            </a:outerShdw>
+          </a:effectLst>
+          <a:scene3d>
+            <a:camera prst="perspectiveRelaxed">
+              <a:rot lat="19800000" lon="1200000" rev="20820000"/>
+            </a:camera>
+            <a:lightRig rig="threePt" dir="t"/>
+          </a:scene3d>
+          <a:sp3d contourW="6350" prstMaterial="matte">
+            <a:bevelT w="101600" h="101600"/>
+            <a:contourClr>
+              <a:srgbClr val="969696"/>
+            </a:contourClr>
+          </a:sp3d>
+        </p:spPr>
+      </p:pic>
+    </p:spTree>
+  </p:cSld>
+  <p:clrMapOvr>
+    <a:masterClrMapping/>
+  </p:clrMapOvr>
+</p:sld>
+</file>
+
+<file path=ppt/slides/slide4.xml><?xml version="1.0" encoding="utf-8"?>
+<p:sld xmlns:a="http://schemas.openxmlformats.org/drawingml/2006/main" xmlns:r="http://schemas.openxmlformats.org/officeDocument/2006/relationships" xmlns:p="http://schemas.openxmlformats.org/presentationml/2006/main">
+  <p:cSld>
+    <p:spTree>
+      <p:nvGrpSpPr>
+        <p:cNvPr id="1" name=""/>
+        <p:cNvGrpSpPr/>
+        <p:nvPr/>
+      </p:nvGrpSpPr>
+      <p:grpSpPr>
+        <a:xfrm>
+          <a:off x="0" y="0"/>
+          <a:ext cx="0" cy="0"/>
+          <a:chOff x="0" y="0"/>
+          <a:chExt cx="0" cy="0"/>
+        </a:xfrm>
+      </p:grpSpPr>
+      <p:pic>
+        <p:nvPicPr>
+          <p:cNvPr id="5" name="Picture 3"/>
+          <p:cNvPicPr>
+            <a:picLocks noChangeAspect="1" noChangeArrowheads="1"/>
+          </p:cNvPicPr>
+          <p:nvPr/>
+        </p:nvPicPr>
+        <p:blipFill>
+          <a:blip r:embed="rId2"/>
+          <a:srcRect/>
+          <a:stretch>
+            <a:fillRect/>
+          </a:stretch>
+        </p:blipFill>
+        <p:spPr bwMode="auto">
+          <a:xfrm>
+            <a:off x="3810000" y="3505200"/>
+            <a:ext cx="4238625" cy="2476500"/>
+          </a:xfrm>
+          <a:prstGeom prst="roundRect">
+            <a:avLst>
+              <a:gd name="adj" fmla="val 16667"/>
+            </a:avLst>
+          </a:prstGeom>
+          <a:ln>
+            <a:noFill/>
+          </a:ln>
+          <a:effectLst>
+            <a:outerShdw blurRad="152400" dist="12000" dir="900000" sy="98000" kx="110000" ky="200000" algn="tl" rotWithShape="0">
+              <a:srgbClr val="000000">
+                <a:alpha val="30000"/>
+              </a:srgbClr>
+            </a:outerShdw>
+          </a:effectLst>
+          <a:scene3d>
+            <a:camera prst="perspectiveRelaxed">
+              <a:rot lat="19800000" lon="1200000" rev="20820000"/>
+            </a:camera>
+            <a:lightRig rig="threePt" dir="t"/>
+          </a:scene3d>
+          <a:sp3d contourW="6350" prstMaterial="matte">
+            <a:bevelT w="101600" h="101600"/>
+            <a:contourClr>
+              <a:srgbClr val="969696"/>
+            </a:contourClr>
+          </a:sp3d>
+        </p:spPr>
+      </p:pic>
+      <p:pic>
+        <p:nvPicPr>
+          <p:cNvPr id="2051" name="Picture 3"/>
+          <p:cNvPicPr>
+            <a:picLocks noChangeAspect="1" noChangeArrowheads="1"/>
+          </p:cNvPicPr>
+          <p:nvPr/>
+        </p:nvPicPr>
+        <p:blipFill>
+          <a:blip r:embed="rId3"/>
+          <a:srcRect/>
+          <a:stretch>
+            <a:fillRect/>
+          </a:stretch>
+        </p:blipFill>
+        <p:spPr bwMode="auto">
+          <a:xfrm>
+            <a:off x="1219200" y="762000"/>
+            <a:ext cx="3400425" cy="2762250"/>
+          </a:xfrm>
+          <a:prstGeom prst="rect">
+            <a:avLst/>
+          </a:prstGeom>
+          <a:noFill/>
+          <a:ln w="9525">
+            <a:noFill/>
+            <a:miter lim="800000"/>
+            <a:headEnd/>
+            <a:tailEnd/>
+          </a:ln>
+          <a:effectLst/>
+        </p:spPr>
+      </p:pic>
+    </p:spTree>
+  </p:cSld>
+  <p:clrMapOvr>
+    <a:masterClrMapping/>
+  </p:clrMapOvr>
+</p:sld>
+</file>
+
+<file path=ppt/slides/slide5.xml><?xml version="1.0" encoding="utf-8"?>
+<p:sld xmlns:a="http://schemas.openxmlformats.org/drawingml/2006/main" xmlns:r="http://schemas.openxmlformats.org/officeDocument/2006/relationships" xmlns:p="http://schemas.openxmlformats.org/presentationml/2006/main">
+  <p:cSld>
+    <p:spTree>
+      <p:nvGrpSpPr>
+        <p:cNvPr id="1" name=""/>
+        <p:cNvGrpSpPr/>
+        <p:nvPr/>
+      </p:nvGrpSpPr>
+      <p:grpSpPr>
+        <a:xfrm>
+          <a:off x="0" y="0"/>
+          <a:ext cx="0" cy="0"/>
+          <a:chOff x="0" y="0"/>
+          <a:chExt cx="0" cy="0"/>
+        </a:xfrm>
+      </p:grpSpPr>
+      <p:pic>
+        <p:nvPicPr>
+          <p:cNvPr id="4" name="Picture 2"/>
+          <p:cNvPicPr>
+            <a:picLocks noChangeAspect="1" noChangeArrowheads="1"/>
+          </p:cNvPicPr>
+          <p:nvPr/>
+        </p:nvPicPr>
+        <p:blipFill>
+          <a:blip r:embed="rId2"/>
+          <a:srcRect/>
+          <a:stretch>
+            <a:fillRect/>
+          </a:stretch>
+        </p:blipFill>
+        <p:spPr bwMode="auto">
+          <a:xfrm>
+            <a:off x="609600" y="3124200"/>
+            <a:ext cx="3962400" cy="3260489"/>
+          </a:xfrm>
+          <a:prstGeom prst="ellipse">
+            <a:avLst/>
+          </a:prstGeom>
+          <a:ln>
+            <a:noFill/>
+          </a:ln>
+          <a:effectLst>
+            <a:softEdge rad="112500"/>
+          </a:effectLst>
+        </p:spPr>
+      </p:pic>
+      <p:pic>
+        <p:nvPicPr>
+          <p:cNvPr id="4098" name="Picture 2"/>
+          <p:cNvPicPr>
+            <a:picLocks noChangeAspect="1" noChangeArrowheads="1"/>
+          </p:cNvPicPr>
+          <p:nvPr/>
+        </p:nvPicPr>
+        <p:blipFill>
+          <a:blip r:embed="rId3"/>
+          <a:srcRect/>
+          <a:stretch>
+            <a:fillRect/>
+          </a:stretch>
+        </p:blipFill>
+        <p:spPr bwMode="auto">
+          <a:xfrm>
+            <a:off x="4648200" y="3124200"/>
+            <a:ext cx="3753482" cy="3124200"/>
+          </a:xfrm>
+          <a:prstGeom prst="rect">
+            <a:avLst/>
+          </a:prstGeom>
+          <a:ln>
+            <a:noFill/>
+          </a:ln>
+          <a:effectLst>
+            <a:softEdge rad="112500"/>
+          </a:effectLst>
+        </p:spPr>
+      </p:pic>
+      <p:sp>
+        <p:nvSpPr>
+          <p:cNvPr id="7" name="Rectangle 6"/>
+          <p:cNvSpPr/>
+          <p:nvPr/>
+        </p:nvSpPr>
+        <p:spPr>
+          <a:xfrm>
+            <a:off x="3200400" y="762000"/>
+            <a:ext cx="2438400" cy="2209800"/>
+          </a:xfrm>
+          <a:prstGeom prst="rect">
+            <a:avLst/>
+          </a:prstGeom>
+          <a:ln w="34925">
+            <a:solidFill>
+              <a:srgbClr val="FFFFFF"/>
+            </a:solidFill>
+          </a:ln>
+          <a:effectLst>
+            <a:outerShdw blurRad="317500" dir="2700000" algn="ctr">
+              <a:srgbClr val="000000">
+                <a:alpha val="43000"/>
+              </a:srgbClr>
+            </a:outerShdw>
+          </a:effectLst>
+          <a:scene3d>
+            <a:camera prst="perspectiveFront" fov="6900000">
+              <a:rot lat="18079905" lon="18450371" rev="3509542"/>
+            </a:camera>
+            <a:lightRig rig="threePt" dir="t">
+              <a:rot lat="0" lon="0" rev="0"/>
+            </a:lightRig>
+          </a:scene3d>
+          <a:sp3d extrusionH="38100" prstMaterial="clear">
+            <a:bevelT w="260350" h="50800" prst="softRound"/>
+            <a:bevelB prst="softRound"/>
+          </a:sp3d>
+        </p:spPr>
+        <p:style>
+          <a:lnRef idx="2">
+            <a:schemeClr val="accent1">
+              <a:shade val="50000"/>
+            </a:schemeClr>
+          </a:lnRef>
+          <a:fillRef idx="1">
+            <a:schemeClr val="accent1"/>
+          </a:fillRef>
+          <a:effectRef idx="0">
+            <a:schemeClr val="accent1"/>
+          </a:effectRef>
+          <a:fontRef idx="minor">
+            <a:schemeClr val="lt1"/>
+          </a:fontRef>
+        </p:style>
+        <p:txBody>
+          <a:bodyPr rtlCol="0" anchor="ctr"/>
+          <a:lstStyle/>
+          <a:p>
+            <a:pPr algn="ctr"/>
+            <a:endParaRPr lang="en-US"/>
+          </a:p>
+        </p:txBody>
+      </p:sp>
+      <p:pic>
+        <p:nvPicPr>
+          <p:cNvPr id="6" name="Picture 5" descr="server-128x128.png"/>
+          <p:cNvPicPr>
+            <a:picLocks noChangeAspect="1"/>
+          </p:cNvPicPr>
+          <p:nvPr/>
+        </p:nvPicPr>
+        <p:blipFill>
+          <a:blip r:embed="rId4"/>
+          <a:stretch>
+            <a:fillRect/>
+          </a:stretch>
+        </p:blipFill>
+        <p:spPr>
+          <a:xfrm>
+            <a:off x="4191000" y="990600"/>
+            <a:ext cx="1219200" cy="1219200"/>
+          </a:xfrm>
+          <a:prstGeom prst="rect">
+            <a:avLst/>
+          </a:prstGeom>
+        </p:spPr>
+      </p:pic>
+      <p:pic>
+        <p:nvPicPr>
+          <p:cNvPr id="9" name="Picture 8" descr="server-128x128.png"/>
+          <p:cNvPicPr>
+            <a:picLocks noChangeAspect="1"/>
+          </p:cNvPicPr>
+          <p:nvPr/>
+        </p:nvPicPr>
+        <p:blipFill>
+          <a:blip r:embed="rId4"/>
+          <a:stretch>
+            <a:fillRect/>
+          </a:stretch>
+        </p:blipFill>
+        <p:spPr>
+          <a:xfrm>
+            <a:off x="3200400" y="1295400"/>
+            <a:ext cx="1219200" cy="1219200"/>
+          </a:xfrm>
+          <a:prstGeom prst="rect">
+            <a:avLst/>
+          </a:prstGeom>
+        </p:spPr>
+      </p:pic>
+      <p:pic>
+        <p:nvPicPr>
+          <p:cNvPr id="4100" name="Picture 4"/>
+          <p:cNvPicPr>
+            <a:picLocks noChangeAspect="1" noChangeArrowheads="1"/>
+          </p:cNvPicPr>
+          <p:nvPr/>
+        </p:nvPicPr>
+        <p:blipFill>
+          <a:blip r:embed="rId5"/>
+          <a:srcRect/>
+          <a:stretch>
+            <a:fillRect/>
+          </a:stretch>
+        </p:blipFill>
+        <p:spPr bwMode="auto">
+          <a:xfrm>
+            <a:off x="457200" y="304800"/>
+            <a:ext cx="3143122" cy="2133600"/>
+          </a:xfrm>
+          <a:prstGeom prst="rect">
+            <a:avLst/>
+          </a:prstGeom>
+          <a:ln>
+            <a:noFill/>
+          </a:ln>
+          <a:effectLst>
+            <a:softEdge rad="112500"/>
+          </a:effectLst>
+        </p:spPr>
+      </p:pic>
+      <p:pic>
+        <p:nvPicPr>
+          <p:cNvPr id="4101" name="Picture 5"/>
+          <p:cNvPicPr>
+            <a:picLocks noChangeAspect="1" noChangeArrowheads="1"/>
+          </p:cNvPicPr>
+          <p:nvPr/>
+        </p:nvPicPr>
+        <p:blipFill>
+          <a:blip r:embed="rId6"/>
+          <a:srcRect/>
+          <a:stretch>
+            <a:fillRect/>
+          </a:stretch>
+        </p:blipFill>
+        <p:spPr bwMode="auto">
+          <a:xfrm>
+            <a:off x="5486400" y="1905000"/>
+            <a:ext cx="2952750" cy="523875"/>
+          </a:xfrm>
+          <a:prstGeom prst="rect">
+            <a:avLst/>
+          </a:prstGeom>
+          <a:noFill/>
+          <a:ln w="9525">
+            <a:noFill/>
+            <a:miter lim="800000"/>
+            <a:headEnd/>
+            <a:tailEnd/>
+          </a:ln>
+          <a:effectLst>
+            <a:softEdge rad="31750"/>
+          </a:effectLst>
+        </p:spPr>
+      </p:pic>
+    </p:spTree>
+  </p:cSld>
+  <p:clrMapOvr>
+    <a:masterClrMapping/>
+  </p:clrMapOvr>
+</p:sld>
+</file>
+
+<file path=ppt/slides/slide6.xml><?xml version="1.0" encoding="utf-8"?>
+<p:sld xmlns:a="http://schemas.openxmlformats.org/drawingml/2006/main" xmlns:r="http://schemas.openxmlformats.org/officeDocument/2006/relationships" xmlns:p="http://schemas.openxmlformats.org/presentationml/2006/main">
+  <p:cSld>
+    <p:spTree>
+      <p:nvGrpSpPr>
+        <p:cNvPr id="1" name=""/>
+        <p:cNvGrpSpPr/>
+        <p:nvPr/>
+      </p:nvGrpSpPr>
+      <p:grpSpPr>
+        <a:xfrm>
+          <a:off x="0" y="0"/>
+          <a:ext cx="0" cy="0"/>
+          <a:chOff x="0" y="0"/>
+          <a:chExt cx="0" cy="0"/>
+        </a:xfrm>
+      </p:grpSpPr>
+      <p:pic>
+        <p:nvPicPr>
+          <p:cNvPr id="5122" name="Picture 2"/>
+          <p:cNvPicPr>
+            <a:picLocks noChangeAspect="1" noChangeArrowheads="1"/>
+          </p:cNvPicPr>
+          <p:nvPr/>
+        </p:nvPicPr>
+        <p:blipFill>
+          <a:blip r:embed="rId2"/>
+          <a:srcRect/>
+          <a:stretch>
+            <a:fillRect/>
+          </a:stretch>
+        </p:blipFill>
+        <p:spPr bwMode="auto">
+          <a:xfrm>
+            <a:off x="2057400" y="1371600"/>
+            <a:ext cx="2508339" cy="2209800"/>
+          </a:xfrm>
+          <a:prstGeom prst="rect">
+            <a:avLst/>
+          </a:prstGeom>
+          <a:solidFill>
+            <a:srgbClr val="FFFFFF">
+              <a:shade val="85000"/>
+            </a:srgbClr>
+          </a:solidFill>
+          <a:ln w="101600" cap="sq">
+            <a:solidFill>
+              <a:srgbClr val="FDFDFD"/>
+            </a:solidFill>
+            <a:miter lim="800000"/>
+          </a:ln>
+          <a:effectLst>
+            <a:outerShdw blurRad="57150" dist="37500" dir="7560000" sy="98000" kx="110000" ky="200000" algn="tl" rotWithShape="0">
+              <a:srgbClr val="000000">
+                <a:alpha val="20000"/>
+              </a:srgbClr>
+            </a:outerShdw>
+          </a:effectLst>
+          <a:scene3d>
+            <a:camera prst="perspectiveRelaxed">
+              <a:rot lat="18960000" lon="0" rev="0"/>
+            </a:camera>
+            <a:lightRig rig="twoPt" dir="t">
+              <a:rot lat="0" lon="0" rev="7200000"/>
+            </a:lightRig>
+          </a:scene3d>
+          <a:sp3d prstMaterial="matte">
+            <a:bevelT w="22860" h="12700"/>
+            <a:contourClr>
+              <a:srgbClr val="FFFFFF"/>
+            </a:contourClr>
+          </a:sp3d>
+        </p:spPr>
+      </p:pic>
+    </p:spTree>
+  </p:cSld>
+  <p:clrMapOvr>
+    <a:masterClrMapping/>
+  </p:clrMapOvr>
+</p:sld>
+</file>
+
+<file path=ppt/slides/slide7.xml><?xml version="1.0" encoding="utf-8"?>
+<p:sld xmlns:a="http://schemas.openxmlformats.org/drawingml/2006/main" xmlns:r="http://schemas.openxmlformats.org/officeDocument/2006/relationships" xmlns:p="http://schemas.openxmlformats.org/presentationml/2006/main">
+  <p:cSld>
+    <p:spTree>
+      <p:nvGrpSpPr>
+        <p:cNvPr id="1" name=""/>
+        <p:cNvGrpSpPr/>
+        <p:nvPr/>
+      </p:nvGrpSpPr>
+      <p:grpSpPr>
+        <a:xfrm>
+          <a:off x="0" y="0"/>
+          <a:ext cx="0" cy="0"/>
+          <a:chOff x="0" y="0"/>
+          <a:chExt cx="0" cy="0"/>
+        </a:xfrm>
+      </p:grpSpPr>
+      <p:pic>
+        <p:nvPicPr>
+          <p:cNvPr id="4" name="Picture 3" descr="document-2-128x128.png"/>
+          <p:cNvPicPr>
+            <a:picLocks noChangeAspect="1"/>
+          </p:cNvPicPr>
+          <p:nvPr/>
+        </p:nvPicPr>
+        <p:blipFill>
+          <a:blip r:embed="rId2"/>
+          <a:stretch>
+            <a:fillRect/>
+          </a:stretch>
+        </p:blipFill>
+        <p:spPr>
+          <a:xfrm>
+            <a:off x="2362200" y="1752600"/>
+            <a:ext cx="1219200" cy="1219200"/>
+          </a:xfrm>
+          <a:prstGeom prst="rect">
+            <a:avLst/>
+          </a:prstGeom>
+        </p:spPr>
+      </p:pic>
+      <p:pic>
+        <p:nvPicPr>
+          <p:cNvPr id="6" name="Picture 5" descr="k-cm-df-128x128.png"/>
+          <p:cNvPicPr>
+            <a:picLocks noChangeAspect="1"/>
+          </p:cNvPicPr>
+          <p:nvPr/>
+        </p:nvPicPr>
+        <p:blipFill>
+          <a:blip r:embed="rId3"/>
+          <a:stretch>
+            <a:fillRect/>
+          </a:stretch>
+        </p:blipFill>
+        <p:spPr>
+          <a:xfrm>
+            <a:off x="3733800" y="1828800"/>
+            <a:ext cx="1219200" cy="1219200"/>
+          </a:xfrm>
+          <a:prstGeom prst="rect">
+            <a:avLst/>
+          </a:prstGeom>
+        </p:spPr>
+      </p:pic>
+      <p:pic>
+        <p:nvPicPr>
+          <p:cNvPr id="7" name="Picture 6" descr="source-java-128x128.png"/>
+          <p:cNvPicPr>
+            <a:picLocks noChangeAspect="1"/>
+          </p:cNvPicPr>
+          <p:nvPr/>
+        </p:nvPicPr>
+        <p:blipFill>
+          <a:blip r:embed="rId4"/>
+          <a:stretch>
+            <a:fillRect/>
+          </a:stretch>
+        </p:blipFill>
+        <p:spPr>
+          <a:xfrm>
+            <a:off x="2590800" y="1981200"/>
+            <a:ext cx="1219200" cy="1219200"/>
+          </a:xfrm>
+          <a:prstGeom prst="rect">
+            <a:avLst/>
+          </a:prstGeom>
+        </p:spPr>
+      </p:pic>
+      <p:pic>
+        <p:nvPicPr>
+          <p:cNvPr id="6146" name="Picture 2"/>
+          <p:cNvPicPr>
+            <a:picLocks noChangeAspect="1" noChangeArrowheads="1"/>
+          </p:cNvPicPr>
+          <p:nvPr/>
+        </p:nvPicPr>
+        <p:blipFill>
+          <a:blip r:embed="rId5"/>
+          <a:srcRect/>
+          <a:stretch>
+            <a:fillRect/>
+          </a:stretch>
+        </p:blipFill>
+        <p:spPr bwMode="auto">
+          <a:xfrm>
+            <a:off x="5791200" y="762000"/>
+            <a:ext cx="2466975" cy="1752600"/>
+          </a:xfrm>
+          <a:prstGeom prst="rect">
+            <a:avLst/>
+          </a:prstGeom>
+          <a:noFill/>
+          <a:ln w="9525">
+            <a:noFill/>
+            <a:miter lim="800000"/>
+            <a:headEnd/>
+            <a:tailEnd/>
+          </a:ln>
+          <a:effectLst/>
+        </p:spPr>
+      </p:pic>
+      <p:pic>
+        <p:nvPicPr>
+          <p:cNvPr id="6147" name="Picture 3"/>
+          <p:cNvPicPr>
+            <a:picLocks noChangeAspect="1" noChangeArrowheads="1"/>
+          </p:cNvPicPr>
+          <p:nvPr/>
+        </p:nvPicPr>
+        <p:blipFill>
+          <a:blip r:embed="rId6"/>
+          <a:srcRect/>
+          <a:stretch>
+            <a:fillRect/>
+          </a:stretch>
+        </p:blipFill>
+        <p:spPr bwMode="auto">
+          <a:xfrm>
+            <a:off x="2971800" y="4114800"/>
+            <a:ext cx="876300" cy="1076325"/>
+          </a:xfrm>
+          <a:prstGeom prst="rect">
+            <a:avLst/>
+          </a:prstGeom>
+          <a:noFill/>
+          <a:ln w="9525">
+            <a:noFill/>
+            <a:miter lim="800000"/>
+            <a:headEnd/>
+            <a:tailEnd/>
+          </a:ln>
+          <a:effectLst>
+            <a:reflection blurRad="6350" stA="50000" endA="300" endPos="38500" dist="50800" dir="5400000" sy="-100000" algn="bl" rotWithShape="0"/>
+          </a:effectLst>
+        </p:spPr>
+      </p:pic>
+      <p:pic>
+        <p:nvPicPr>
+          <p:cNvPr id="6148" name="Picture 4"/>
+          <p:cNvPicPr>
+            <a:picLocks noChangeAspect="1" noChangeArrowheads="1"/>
+          </p:cNvPicPr>
+          <p:nvPr/>
+        </p:nvPicPr>
+        <p:blipFill>
+          <a:blip r:embed="rId7"/>
+          <a:srcRect/>
+          <a:stretch>
+            <a:fillRect/>
+          </a:stretch>
+        </p:blipFill>
+        <p:spPr bwMode="auto">
+          <a:xfrm>
+            <a:off x="3962400" y="4495800"/>
+            <a:ext cx="819150" cy="704850"/>
+          </a:xfrm>
+          <a:prstGeom prst="rect">
+            <a:avLst/>
+          </a:prstGeom>
+          <a:noFill/>
+          <a:ln w="9525">
+            <a:noFill/>
+            <a:miter lim="800000"/>
+            <a:headEnd/>
+            <a:tailEnd/>
+          </a:ln>
+          <a:effectLst>
+            <a:reflection blurRad="6350" stA="50000" endA="300" endPos="55000" dir="5400000" sy="-100000" algn="bl" rotWithShape="0"/>
+          </a:effectLst>
+        </p:spPr>
+      </p:pic>
+      <p:pic>
+        <p:nvPicPr>
+          <p:cNvPr id="6149" name="Picture 5"/>
+          <p:cNvPicPr>
+            <a:picLocks noChangeAspect="1" noChangeArrowheads="1"/>
+          </p:cNvPicPr>
+          <p:nvPr/>
+        </p:nvPicPr>
+        <p:blipFill>
+          <a:blip r:embed="rId8"/>
+          <a:srcRect/>
+          <a:stretch>
+            <a:fillRect/>
+          </a:stretch>
+        </p:blipFill>
+        <p:spPr bwMode="auto">
+          <a:xfrm>
+            <a:off x="5562600" y="2971800"/>
+            <a:ext cx="1781175" cy="1123950"/>
+          </a:xfrm>
+          <a:prstGeom prst="roundRect">
+            <a:avLst>
+              <a:gd name="adj" fmla="val 4167"/>
+            </a:avLst>
+          </a:prstGeom>
+          <a:solidFill>
+            <a:srgbClr val="FFFFFF"/>
+          </a:solidFill>
+          <a:ln w="76200" cap="sq">
+            <a:solidFill>
+              <a:srgbClr val="EAEAEA"/>
+            </a:solidFill>
+            <a:miter lim="800000"/>
+          </a:ln>
+          <a:effectLst>
+            <a:reflection blurRad="12700" stA="33000" endPos="28000" dist="5000" dir="5400000" sy="-100000" algn="bl" rotWithShape="0"/>
+          </a:effectLst>
+          <a:scene3d>
+            <a:camera prst="orthographicFront"/>
+            <a:lightRig rig="threePt" dir="t">
+              <a:rot lat="0" lon="0" rev="2700000"/>
+            </a:lightRig>
+          </a:scene3d>
+          <a:sp3d contourW="6350">
+            <a:bevelT h="38100"/>
+            <a:contourClr>
+              <a:srgbClr val="C0C0C0"/>
+            </a:contourClr>
+          </a:sp3d>
+        </p:spPr>
+      </p:pic>
+    </p:spTree>
+  </p:cSld>
+  <p:clrMapOvr>
+    <a:masterClrMapping/>
+  </p:clrMapOvr>
+</p:sld>
+</file>
+
+<file path=ppt/slides/slide8.xml><?xml version="1.0" encoding="utf-8"?>
+<p:sld xmlns:a="http://schemas.openxmlformats.org/drawingml/2006/main" xmlns:r="http://schemas.openxmlformats.org/officeDocument/2006/relationships" xmlns:p="http://schemas.openxmlformats.org/presentationml/2006/main">
+  <p:cSld>
+    <p:spTree>
+      <p:nvGrpSpPr>
+        <p:cNvPr id="1" name=""/>
+        <p:cNvGrpSpPr/>
+        <p:nvPr/>
+      </p:nvGrpSpPr>
+      <p:grpSpPr>
+        <a:xfrm>
+          <a:off x="0" y="0"/>
+          <a:ext cx="0" cy="0"/>
+          <a:chOff x="0" y="0"/>
+          <a:chExt cx="0" cy="0"/>
+        </a:xfrm>
+      </p:grpSpPr>
+      <p:pic>
+        <p:nvPicPr>
+          <p:cNvPr id="5" name="Picture 4" descr="dl_background.png"/>
+          <p:cNvPicPr>
+            <a:picLocks noChangeAspect="1"/>
+          </p:cNvPicPr>
+          <p:nvPr/>
+        </p:nvPicPr>
+        <p:blipFill>
+          <a:blip r:embed="rId2"/>
+          <a:stretch>
+            <a:fillRect/>
+          </a:stretch>
+        </p:blipFill>
+        <p:spPr>
+          <a:xfrm>
+            <a:off x="2667000" y="1514475"/>
+            <a:ext cx="1677537" cy="1685925"/>
+          </a:xfrm>
+          <a:prstGeom prst="rect">
+            <a:avLst/>
+          </a:prstGeom>
+        </p:spPr>
+      </p:pic>
     </p:spTree>
   </p:cSld>
   <p:clrMapOvr>

</xml_diff>